<commit_message>
Moved all js code to js folder
</commit_message>
<xml_diff>
--- a/diagrams/Structuring & Interfacing Externally.pptx
+++ b/diagrams/Structuring & Interfacing Externally.pptx
@@ -10,9 +10,9 @@
   <p:sldIdLst>
     <p:sldId id="256" r:id="rId2"/>
     <p:sldId id="257" r:id="rId3"/>
-    <p:sldId id="269" r:id="rId4"/>
+    <p:sldId id="261" r:id="rId4"/>
     <p:sldId id="264" r:id="rId5"/>
-    <p:sldId id="261" r:id="rId6"/>
+    <p:sldId id="269" r:id="rId6"/>
     <p:sldId id="262" r:id="rId7"/>
     <p:sldId id="268" r:id="rId8"/>
   </p:sldIdLst>
@@ -1019,11 +1019,6 @@
         </p:txBody>
       </p:sp>
     </p:spTree>
-    <p:extLst>
-      <p:ext uri="{BB962C8B-B14F-4D97-AF65-F5344CB8AC3E}">
-        <p14:creationId xmlns:p14="http://schemas.microsoft.com/office/powerpoint/2010/main" val="4046187894"/>
-      </p:ext>
-    </p:extLst>
   </p:cSld>
   <p:clrMapOvr>
     <a:masterClrMapping/>
@@ -1232,6 +1227,11 @@
         </p:txBody>
       </p:sp>
     </p:spTree>
+    <p:extLst>
+      <p:ext uri="{BB962C8B-B14F-4D97-AF65-F5344CB8AC3E}">
+        <p14:creationId xmlns:p14="http://schemas.microsoft.com/office/powerpoint/2010/main" val="4046187894"/>
+      </p:ext>
+    </p:extLst>
   </p:cSld>
   <p:clrMapOvr>
     <a:masterClrMapping/>
@@ -6285,29 +6285,32 @@
                 <a:cs typeface="Gill Sans"/>
                 <a:sym typeface="Gill Sans"/>
               </a:rPr>
-              <a:t>Inheritance &amp; Static Methods</a:t>
+              <a:t>Structuring &amp; Interfacing </a:t>
             </a:r>
-            <a:endParaRPr lang="en-US" sz="1500" dirty="0">
-              <a:solidFill>
-                <a:srgbClr val="D7623A"/>
-              </a:solidFill>
-              <a:latin typeface="Gill Sans"/>
-              <a:ea typeface="Gill Sans"/>
-              <a:cs typeface="Gill Sans"/>
-              <a:sym typeface="Gill Sans"/>
-            </a:endParaRPr>
-          </a:p>
-          <a:p>
-            <a:pPr marL="0" lvl="0" indent="0" algn="l" rtl="0">
-              <a:spcBef>
-                <a:spcPts val="0"/>
-              </a:spcBef>
-              <a:spcAft>
-                <a:spcPts val="0"/>
-              </a:spcAft>
-              <a:buNone/>
-            </a:pPr>
-            <a:endParaRPr sz="1800" dirty="0">
+            <a:br>
+              <a:rPr lang="en-US" sz="2000" dirty="0">
+                <a:solidFill>
+                  <a:srgbClr val="649E8F"/>
+                </a:solidFill>
+                <a:latin typeface="Gill Sans"/>
+                <a:ea typeface="Gill Sans"/>
+                <a:cs typeface="Gill Sans"/>
+                <a:sym typeface="Gill Sans"/>
+              </a:rPr>
+            </a:br>
+            <a:r>
+              <a:rPr lang="en-US" sz="2000" dirty="0">
+                <a:solidFill>
+                  <a:srgbClr val="649E8F"/>
+                </a:solidFill>
+                <a:latin typeface="Gill Sans"/>
+                <a:ea typeface="Gill Sans"/>
+                <a:cs typeface="Gill Sans"/>
+                <a:sym typeface="Gill Sans"/>
+              </a:rPr>
+              <a:t>Externally</a:t>
+            </a:r>
+            <a:endParaRPr lang="en-US" sz="1800" dirty="0">
               <a:solidFill>
                 <a:srgbClr val="D7623A"/>
               </a:solidFill>
@@ -7182,7 +7185,7 @@
                 <a:cs typeface="Gill Sans"/>
                 <a:sym typeface="Gill Sans"/>
               </a:rPr>
-              <a:t>RECAP: OOP</a:t>
+              <a:t>Inheritance &amp; Static Methods</a:t>
             </a:r>
           </a:p>
         </p:txBody>
@@ -7392,7 +7395,7 @@
                 <a:cs typeface="Gill Sans"/>
                 <a:sym typeface="Gill Sans"/>
               </a:rPr>
-              <a:t>OOP</a:t>
+              <a:t>Object Constructor and Factory Functions</a:t>
             </a:r>
           </a:p>
           <a:p>
@@ -7420,7 +7423,7 @@
                 <a:cs typeface="Gill Sans"/>
                 <a:sym typeface="Gill Sans"/>
               </a:rPr>
-              <a:t>Variable Scope &amp; Data Encapsulation</a:t>
+              <a:t>Prototypes Intro</a:t>
             </a:r>
           </a:p>
           <a:p>
@@ -7448,7 +7451,7 @@
                 <a:cs typeface="Gill Sans"/>
                 <a:sym typeface="Gill Sans"/>
               </a:rPr>
-              <a:t>Classes</a:t>
+              <a:t>Inheritance Intro</a:t>
             </a:r>
           </a:p>
           <a:p>
@@ -7476,7 +7479,7 @@
                 <a:cs typeface="Gill Sans"/>
                 <a:sym typeface="Gill Sans"/>
               </a:rPr>
-              <a:t>Object Privacy with Object Accessors</a:t>
+              <a:t>Properties and Methods with Inheritance</a:t>
             </a:r>
           </a:p>
           <a:p>
@@ -7504,7 +7507,7 @@
                 <a:cs typeface="Gill Sans"/>
                 <a:sym typeface="Gill Sans"/>
               </a:rPr>
-              <a:t>Understanding this</a:t>
+              <a:t>Static Methods</a:t>
             </a:r>
           </a:p>
         </p:txBody>
@@ -7538,11 +7541,6 @@
         </p:spPr>
       </p:pic>
     </p:spTree>
-    <p:extLst>
-      <p:ext uri="{BB962C8B-B14F-4D97-AF65-F5344CB8AC3E}">
-        <p14:creationId xmlns:p14="http://schemas.microsoft.com/office/powerpoint/2010/main" val="979598081"/>
-      </p:ext>
-    </p:extLst>
   </p:cSld>
   <p:clrMapOvr>
     <a:masterClrMapping/>
@@ -7828,8 +7826,8 @@
         </p:nvSpPr>
         <p:spPr>
           <a:xfrm>
-            <a:off x="5579600" y="908575"/>
-            <a:ext cx="2598900" cy="774000"/>
+            <a:off x="5579599" y="908575"/>
+            <a:ext cx="3399573" cy="774000"/>
           </a:xfrm>
           <a:prstGeom prst="rect">
             <a:avLst/>
@@ -7864,7 +7862,7 @@
                 <a:cs typeface="Gill Sans"/>
                 <a:sym typeface="Gill Sans"/>
               </a:rPr>
-              <a:t>Inheritance &amp; Static Methods</a:t>
+              <a:t>Structuring &amp; Interfacing Externally</a:t>
             </a:r>
           </a:p>
         </p:txBody>
@@ -8074,7 +8072,7 @@
                 <a:cs typeface="Gill Sans"/>
                 <a:sym typeface="Gill Sans"/>
               </a:rPr>
-              <a:t>Object Constructor and Factory Functions</a:t>
+              <a:t>JSON Intro</a:t>
             </a:r>
           </a:p>
           <a:p>
@@ -8102,7 +8100,7 @@
                 <a:cs typeface="Gill Sans"/>
                 <a:sym typeface="Gill Sans"/>
               </a:rPr>
-              <a:t>Prototypes Intro</a:t>
+              <a:t>JSON in use</a:t>
             </a:r>
           </a:p>
           <a:p>
@@ -8130,7 +8128,7 @@
                 <a:cs typeface="Gill Sans"/>
                 <a:sym typeface="Gill Sans"/>
               </a:rPr>
-              <a:t>Inheritance Intro</a:t>
+              <a:t>Session and local Storage</a:t>
             </a:r>
           </a:p>
           <a:p>
@@ -8158,7 +8156,7 @@
                 <a:cs typeface="Gill Sans"/>
                 <a:sym typeface="Gill Sans"/>
               </a:rPr>
-              <a:t>Properties and Methods with Inheritance</a:t>
+              <a:t>Asynchronous Programming Intro</a:t>
             </a:r>
           </a:p>
           <a:p>
@@ -8186,7 +8184,35 @@
                 <a:cs typeface="Gill Sans"/>
                 <a:sym typeface="Gill Sans"/>
               </a:rPr>
-              <a:t>Static Methods</a:t>
+              <a:t>Promises Intro</a:t>
+            </a:r>
+          </a:p>
+          <a:p>
+            <a:pPr marL="457200" lvl="0" indent="-355600" algn="l" rtl="0">
+              <a:spcBef>
+                <a:spcPts val="0"/>
+              </a:spcBef>
+              <a:spcAft>
+                <a:spcPts val="0"/>
+              </a:spcAft>
+              <a:buClr>
+                <a:srgbClr val="FFFFFF"/>
+              </a:buClr>
+              <a:buSzPts val="2000"/>
+              <a:buFont typeface="Gill Sans"/>
+              <a:buChar char="●"/>
+            </a:pPr>
+            <a:r>
+              <a:rPr lang="en-US" sz="2000" dirty="0">
+                <a:solidFill>
+                  <a:srgbClr val="FFFFFF"/>
+                </a:solidFill>
+                <a:latin typeface="Gill Sans"/>
+                <a:ea typeface="Gill Sans"/>
+                <a:cs typeface="Gill Sans"/>
+                <a:sym typeface="Gill Sans"/>
+              </a:rPr>
+              <a:t>Separation of Concerns and Composition</a:t>
             </a:r>
           </a:p>
         </p:txBody>
@@ -8220,6 +8246,11 @@
         </p:spPr>
       </p:pic>
     </p:spTree>
+    <p:extLst>
+      <p:ext uri="{BB962C8B-B14F-4D97-AF65-F5344CB8AC3E}">
+        <p14:creationId xmlns:p14="http://schemas.microsoft.com/office/powerpoint/2010/main" val="979598081"/>
+      </p:ext>
+    </p:extLst>
   </p:cSld>
   <p:clrMapOvr>
     <a:masterClrMapping/>

</xml_diff>